<commit_message>
update presentation graphics with visual changes
</commit_message>
<xml_diff>
--- a/documents/MamaG_Presentation.pptx
+++ b/documents/MamaG_Presentation.pptx
@@ -10,13 +10,13 @@
     <p:sldId id="258" r:id="rId4"/>
     <p:sldId id="259" r:id="rId5"/>
     <p:sldId id="260" r:id="rId6"/>
-    <p:sldId id="261" r:id="rId7"/>
-    <p:sldId id="262" r:id="rId8"/>
-    <p:sldId id="263" r:id="rId9"/>
-    <p:sldId id="264" r:id="rId10"/>
-    <p:sldId id="265" r:id="rId11"/>
-    <p:sldId id="266" r:id="rId12"/>
-    <p:sldId id="267" r:id="rId13"/>
+    <p:sldId id="262" r:id="rId7"/>
+    <p:sldId id="263" r:id="rId8"/>
+    <p:sldId id="264" r:id="rId9"/>
+    <p:sldId id="265" r:id="rId10"/>
+    <p:sldId id="266" r:id="rId11"/>
+    <p:sldId id="267" r:id="rId12"/>
+    <p:sldId id="261" r:id="rId13"/>
     <p:sldId id="268" r:id="rId14"/>
     <p:sldId id="269" r:id="rId15"/>
     <p:sldId id="270" r:id="rId16"/>
@@ -261,7 +261,7 @@
           <a:p>
             <a:fld id="{04479EDF-97A5-494E-AAF6-7EBC952C85CA}" type="datetimeFigureOut">
               <a:rPr lang="en-US" smtClean="0"/>
-              <a:t>11/9/2015</a:t>
+              <a:t>11/9/15</a:t>
             </a:fld>
             <a:endParaRPr lang="en-US"/>
           </a:p>
@@ -431,7 +431,7 @@
           <a:p>
             <a:fld id="{04479EDF-97A5-494E-AAF6-7EBC952C85CA}" type="datetimeFigureOut">
               <a:rPr lang="en-US" smtClean="0"/>
-              <a:t>11/9/2015</a:t>
+              <a:t>11/9/15</a:t>
             </a:fld>
             <a:endParaRPr lang="en-US"/>
           </a:p>
@@ -611,7 +611,7 @@
           <a:p>
             <a:fld id="{04479EDF-97A5-494E-AAF6-7EBC952C85CA}" type="datetimeFigureOut">
               <a:rPr lang="en-US" smtClean="0"/>
-              <a:t>11/9/2015</a:t>
+              <a:t>11/9/15</a:t>
             </a:fld>
             <a:endParaRPr lang="en-US"/>
           </a:p>
@@ -781,7 +781,7 @@
           <a:p>
             <a:fld id="{04479EDF-97A5-494E-AAF6-7EBC952C85CA}" type="datetimeFigureOut">
               <a:rPr lang="en-US" smtClean="0"/>
-              <a:t>11/9/2015</a:t>
+              <a:t>11/9/15</a:t>
             </a:fld>
             <a:endParaRPr lang="en-US"/>
           </a:p>
@@ -1027,7 +1027,7 @@
           <a:p>
             <a:fld id="{04479EDF-97A5-494E-AAF6-7EBC952C85CA}" type="datetimeFigureOut">
               <a:rPr lang="en-US" smtClean="0"/>
-              <a:t>11/9/2015</a:t>
+              <a:t>11/9/15</a:t>
             </a:fld>
             <a:endParaRPr lang="en-US"/>
           </a:p>
@@ -1259,7 +1259,7 @@
           <a:p>
             <a:fld id="{04479EDF-97A5-494E-AAF6-7EBC952C85CA}" type="datetimeFigureOut">
               <a:rPr lang="en-US" smtClean="0"/>
-              <a:t>11/9/2015</a:t>
+              <a:t>11/9/15</a:t>
             </a:fld>
             <a:endParaRPr lang="en-US"/>
           </a:p>
@@ -1626,7 +1626,7 @@
           <a:p>
             <a:fld id="{04479EDF-97A5-494E-AAF6-7EBC952C85CA}" type="datetimeFigureOut">
               <a:rPr lang="en-US" smtClean="0"/>
-              <a:t>11/9/2015</a:t>
+              <a:t>11/9/15</a:t>
             </a:fld>
             <a:endParaRPr lang="en-US"/>
           </a:p>
@@ -1744,7 +1744,7 @@
           <a:p>
             <a:fld id="{04479EDF-97A5-494E-AAF6-7EBC952C85CA}" type="datetimeFigureOut">
               <a:rPr lang="en-US" smtClean="0"/>
-              <a:t>11/9/2015</a:t>
+              <a:t>11/9/15</a:t>
             </a:fld>
             <a:endParaRPr lang="en-US"/>
           </a:p>
@@ -1839,7 +1839,7 @@
           <a:p>
             <a:fld id="{04479EDF-97A5-494E-AAF6-7EBC952C85CA}" type="datetimeFigureOut">
               <a:rPr lang="en-US" smtClean="0"/>
-              <a:t>11/9/2015</a:t>
+              <a:t>11/9/15</a:t>
             </a:fld>
             <a:endParaRPr lang="en-US"/>
           </a:p>
@@ -2116,7 +2116,7 @@
           <a:p>
             <a:fld id="{04479EDF-97A5-494E-AAF6-7EBC952C85CA}" type="datetimeFigureOut">
               <a:rPr lang="en-US" smtClean="0"/>
-              <a:t>11/9/2015</a:t>
+              <a:t>11/9/15</a:t>
             </a:fld>
             <a:endParaRPr lang="en-US"/>
           </a:p>
@@ -2369,7 +2369,7 @@
           <a:p>
             <a:fld id="{04479EDF-97A5-494E-AAF6-7EBC952C85CA}" type="datetimeFigureOut">
               <a:rPr lang="en-US" smtClean="0"/>
-              <a:t>11/9/2015</a:t>
+              <a:t>11/9/15</a:t>
             </a:fld>
             <a:endParaRPr lang="en-US"/>
           </a:p>
@@ -2582,7 +2582,7 @@
           <a:p>
             <a:fld id="{04479EDF-97A5-494E-AAF6-7EBC952C85CA}" type="datetimeFigureOut">
               <a:rPr lang="en-US" smtClean="0"/>
-              <a:t>11/9/2015</a:t>
+              <a:t>11/9/15</a:t>
             </a:fld>
             <a:endParaRPr lang="en-US"/>
           </a:p>
@@ -3062,7 +3062,7 @@
   <p:timing>
     <p:tnLst>
       <p:par>
-        <p:cTn id="1" dur="indefinite" restart="never" nodeType="tmRoot"/>
+        <p:cTn xmlns:p14="http://schemas.microsoft.com/office/powerpoint/2010/main" id="1" dur="indefinite" restart="never" nodeType="tmRoot"/>
       </p:par>
     </p:tnLst>
   </p:timing>
@@ -3103,7 +3103,7 @@
           <a:p>
             <a:r>
               <a:rPr lang="en-US" dirty="0" smtClean="0"/>
-              <a:t>Coupon Management and Delete Coupon</a:t>
+              <a:t>Coupon Management and View All Coupons</a:t>
             </a:r>
             <a:endParaRPr lang="en-US" dirty="0"/>
           </a:p>
@@ -3121,8 +3121,8 @@
         </p:nvSpPr>
         <p:spPr>
           <a:xfrm>
-            <a:off x="5384800" y="3595688"/>
-            <a:ext cx="5969000" cy="1725036"/>
+            <a:off x="838200" y="5472113"/>
+            <a:ext cx="10515600" cy="965632"/>
           </a:xfrm>
         </p:spPr>
         <p:txBody>
@@ -3131,7 +3131,7 @@
           <a:p>
             <a:r>
               <a:rPr lang="en-US" dirty="0" smtClean="0"/>
-              <a:t>You can delete a coupon by selecting it and simply clicking Delete Coupon.</a:t>
+              <a:t>Here we can view all existing coupons in our database.</a:t>
             </a:r>
             <a:endParaRPr lang="en-US" dirty="0"/>
           </a:p>
@@ -3139,7 +3139,7 @@
       </p:sp>
       <p:pic>
         <p:nvPicPr>
-          <p:cNvPr id="5" name="Picture 4"/>
+          <p:cNvPr id="6" name="Picture 5"/>
           <p:cNvPicPr>
             <a:picLocks noChangeAspect="1"/>
           </p:cNvPicPr>
@@ -3153,8 +3153,8 @@
         </p:blipFill>
         <p:spPr>
           <a:xfrm>
-            <a:off x="838200" y="1690688"/>
-            <a:ext cx="10677525" cy="1905000"/>
+            <a:off x="1433512" y="3328988"/>
+            <a:ext cx="9324975" cy="2143125"/>
           </a:xfrm>
           <a:prstGeom prst="rect">
             <a:avLst/>
@@ -3163,22 +3163,28 @@
       </p:pic>
       <p:pic>
         <p:nvPicPr>
-          <p:cNvPr id="6" name="Picture 5"/>
+          <p:cNvPr id="5" name="Picture 4" descr="Screen Shot 2015-11-09 at 3.02.15 AM.png"/>
           <p:cNvPicPr>
             <a:picLocks noChangeAspect="1"/>
           </p:cNvPicPr>
           <p:nvPr/>
         </p:nvPicPr>
         <p:blipFill>
-          <a:blip r:embed="rId3"/>
+          <a:blip r:embed="rId3">
+            <a:extLst>
+              <a:ext uri="{28A0092B-C50C-407E-A947-70E740481C1C}">
+                <a14:useLocalDpi xmlns:a14="http://schemas.microsoft.com/office/drawing/2010/main" val="0"/>
+              </a:ext>
+            </a:extLst>
+          </a:blip>
           <a:stretch>
             <a:fillRect/>
           </a:stretch>
         </p:blipFill>
         <p:spPr>
           <a:xfrm>
-            <a:off x="838200" y="3595688"/>
-            <a:ext cx="4619625" cy="2028825"/>
+            <a:off x="1197885" y="1425276"/>
+            <a:ext cx="9796231" cy="1728185"/>
           </a:xfrm>
           <a:prstGeom prst="rect">
             <a:avLst/>
@@ -3188,7 +3194,7 @@
     </p:spTree>
     <p:extLst>
       <p:ext uri="{BB962C8B-B14F-4D97-AF65-F5344CB8AC3E}">
-        <p14:creationId xmlns:p14="http://schemas.microsoft.com/office/powerpoint/2010/main" val="3257540605"/>
+        <p14:creationId xmlns:p14="http://schemas.microsoft.com/office/powerpoint/2010/main" val="613645464"/>
       </p:ext>
     </p:extLst>
   </p:cSld>
@@ -3198,7 +3204,7 @@
   <p:timing>
     <p:tnLst>
       <p:par>
-        <p:cTn id="1" dur="indefinite" restart="never" nodeType="tmRoot"/>
+        <p:cTn xmlns:p14="http://schemas.microsoft.com/office/powerpoint/2010/main" id="1" dur="indefinite" restart="never" nodeType="tmRoot"/>
       </p:par>
     </p:tnLst>
   </p:timing>
@@ -3239,7 +3245,7 @@
           <a:p>
             <a:r>
               <a:rPr lang="en-US" dirty="0" smtClean="0"/>
-              <a:t>Coupon Management and View All Coupons</a:t>
+              <a:t>Reports </a:t>
             </a:r>
             <a:endParaRPr lang="en-US" dirty="0"/>
           </a:p>
@@ -3247,74 +3253,115 @@
       </p:sp>
       <p:sp>
         <p:nvSpPr>
-          <p:cNvPr id="3" name="Content Placeholder 2"/>
-          <p:cNvSpPr>
-            <a:spLocks noGrp="1"/>
-          </p:cNvSpPr>
-          <p:nvPr>
-            <p:ph idx="1"/>
-          </p:nvPr>
+          <p:cNvPr id="5" name="TextBox 4"/>
+          <p:cNvSpPr txBox="1"/>
+          <p:nvPr/>
         </p:nvSpPr>
         <p:spPr>
           <a:xfrm>
-            <a:off x="838200" y="5472113"/>
-            <a:ext cx="10515600" cy="965632"/>
+            <a:off x="1145309" y="3491345"/>
+            <a:ext cx="9652000" cy="1754327"/>
           </a:xfrm>
+          <a:prstGeom prst="rect">
+            <a:avLst/>
+          </a:prstGeom>
+          <a:noFill/>
         </p:spPr>
         <p:txBody>
-          <a:bodyPr/>
-          <a:lstStyle/>
-          <a:p>
-            <a:r>
-              <a:rPr lang="en-US" dirty="0" smtClean="0"/>
-              <a:t>Here we can view all existing coupons in our database.</a:t>
-            </a:r>
-            <a:endParaRPr lang="en-US" dirty="0"/>
+          <a:bodyPr wrap="square" rtlCol="0">
+            <a:spAutoFit/>
+          </a:bodyPr>
+          <a:lstStyle/>
+          <a:p>
+            <a:pPr marL="285750" indent="-285750">
+              <a:buFont typeface="Arial" panose="020B0604020202020204" pitchFamily="34" charset="0"/>
+              <a:buChar char="•"/>
+            </a:pPr>
+            <a:r>
+              <a:rPr lang="en-US" dirty="0" smtClean="0"/>
+              <a:t>The application is capable of generating reports by pulling information from the database</a:t>
+            </a:r>
+          </a:p>
+          <a:p>
+            <a:pPr marL="742950" lvl="1" indent="-285750">
+              <a:buFont typeface="Arial" panose="020B0604020202020204" pitchFamily="34" charset="0"/>
+              <a:buChar char="•"/>
+            </a:pPr>
+            <a:r>
+              <a:rPr lang="en-US" dirty="0" smtClean="0"/>
+              <a:t>Sales Summary Report</a:t>
+            </a:r>
+          </a:p>
+          <a:p>
+            <a:pPr marL="742950" lvl="1" indent="-285750">
+              <a:buFont typeface="Arial" panose="020B0604020202020204" pitchFamily="34" charset="0"/>
+              <a:buChar char="•"/>
+            </a:pPr>
+            <a:r>
+              <a:rPr lang="en-US" dirty="0" smtClean="0"/>
+              <a:t>Generate </a:t>
+            </a:r>
+            <a:r>
+              <a:rPr lang="en-US" dirty="0" smtClean="0"/>
+              <a:t>Sales Report</a:t>
+            </a:r>
+          </a:p>
+          <a:p>
+            <a:pPr marL="742950" lvl="1" indent="-285750">
+              <a:buFont typeface="Arial" panose="020B0604020202020204" pitchFamily="34" charset="0"/>
+              <a:buChar char="•"/>
+            </a:pPr>
+            <a:r>
+              <a:rPr lang="en-US" dirty="0" smtClean="0"/>
+              <a:t>Customer Absent Report</a:t>
+            </a:r>
+          </a:p>
+          <a:p>
+            <a:pPr marL="742950" lvl="1" indent="-285750">
+              <a:buFont typeface="Arial" panose="020B0604020202020204" pitchFamily="34" charset="0"/>
+              <a:buChar char="•"/>
+            </a:pPr>
+            <a:r>
+              <a:rPr lang="en-US" dirty="0" smtClean="0"/>
+              <a:t>Frequent Buyer</a:t>
+            </a:r>
+          </a:p>
+          <a:p>
+            <a:pPr marL="742950" lvl="1" indent="-285750">
+              <a:buFont typeface="Arial" panose="020B0604020202020204" pitchFamily="34" charset="0"/>
+              <a:buChar char="•"/>
+            </a:pPr>
+            <a:r>
+              <a:rPr lang="en-US" dirty="0" smtClean="0"/>
+              <a:t>Coupon Ratio Report</a:t>
+            </a:r>
           </a:p>
         </p:txBody>
       </p:sp>
       <p:pic>
         <p:nvPicPr>
-          <p:cNvPr id="4" name="Picture 3"/>
+          <p:cNvPr id="3" name="Picture 2" descr="Screen Shot 2015-11-09 at 3.04.49 AM.png"/>
           <p:cNvPicPr>
             <a:picLocks noChangeAspect="1"/>
           </p:cNvPicPr>
           <p:nvPr/>
         </p:nvPicPr>
         <p:blipFill>
-          <a:blip r:embed="rId2"/>
+          <a:blip r:embed="rId2">
+            <a:extLst>
+              <a:ext uri="{28A0092B-C50C-407E-A947-70E740481C1C}">
+                <a14:useLocalDpi xmlns:a14="http://schemas.microsoft.com/office/drawing/2010/main" val="0"/>
+              </a:ext>
+            </a:extLst>
+          </a:blip>
           <a:stretch>
             <a:fillRect/>
           </a:stretch>
         </p:blipFill>
         <p:spPr>
           <a:xfrm>
-            <a:off x="523875" y="1690688"/>
-            <a:ext cx="10829925" cy="1638300"/>
-          </a:xfrm>
-          <a:prstGeom prst="rect">
-            <a:avLst/>
-          </a:prstGeom>
-        </p:spPr>
-      </p:pic>
-      <p:pic>
-        <p:nvPicPr>
-          <p:cNvPr id="6" name="Picture 5"/>
-          <p:cNvPicPr>
-            <a:picLocks noChangeAspect="1"/>
-          </p:cNvPicPr>
-          <p:nvPr/>
-        </p:nvPicPr>
-        <p:blipFill>
-          <a:blip r:embed="rId3"/>
-          <a:stretch>
-            <a:fillRect/>
-          </a:stretch>
-        </p:blipFill>
-        <p:spPr>
-          <a:xfrm>
-            <a:off x="1433512" y="3328988"/>
-            <a:ext cx="9324975" cy="2143125"/>
+            <a:off x="1474320" y="1470290"/>
+            <a:ext cx="9243360" cy="1863143"/>
           </a:xfrm>
           <a:prstGeom prst="rect">
             <a:avLst/>
@@ -3324,7 +3371,7 @@
     </p:spTree>
     <p:extLst>
       <p:ext uri="{BB962C8B-B14F-4D97-AF65-F5344CB8AC3E}">
-        <p14:creationId xmlns:p14="http://schemas.microsoft.com/office/powerpoint/2010/main" val="613645464"/>
+        <p14:creationId xmlns:p14="http://schemas.microsoft.com/office/powerpoint/2010/main" val="592636215"/>
       </p:ext>
     </p:extLst>
   </p:cSld>
@@ -3334,7 +3381,7 @@
   <p:timing>
     <p:tnLst>
       <p:par>
-        <p:cTn id="1" dur="indefinite" restart="never" nodeType="tmRoot"/>
+        <p:cTn xmlns:p14="http://schemas.microsoft.com/office/powerpoint/2010/main" id="1" dur="indefinite" restart="never" nodeType="tmRoot"/>
       </p:par>
     </p:tnLst>
   </p:timing>
@@ -3375,113 +3422,89 @@
           <a:p>
             <a:r>
               <a:rPr lang="en-US" dirty="0" smtClean="0"/>
-              <a:t>Reports </a:t>
+              <a:t>Reports and Sales </a:t>
+            </a:r>
+            <a:r>
+              <a:rPr lang="en-US" dirty="0" smtClean="0"/>
+              <a:t>Summary Report</a:t>
             </a:r>
             <a:endParaRPr lang="en-US" dirty="0"/>
+          </a:p>
+        </p:txBody>
+      </p:sp>
+      <p:sp>
+        <p:nvSpPr>
+          <p:cNvPr id="3" name="Content Placeholder 2"/>
+          <p:cNvSpPr>
+            <a:spLocks noGrp="1"/>
+          </p:cNvSpPr>
+          <p:nvPr>
+            <p:ph idx="1"/>
+          </p:nvPr>
+        </p:nvSpPr>
+        <p:spPr>
+          <a:xfrm>
+            <a:off x="2677787" y="3852897"/>
+            <a:ext cx="6643255" cy="2514453"/>
+          </a:xfrm>
+        </p:spPr>
+        <p:txBody>
+          <a:bodyPr/>
+          <a:lstStyle/>
+          <a:p>
+            <a:r>
+              <a:rPr lang="en-US" dirty="0" smtClean="0"/>
+              <a:t>The Sales Summary Report tab displays sales information for the current date.</a:t>
+            </a:r>
+          </a:p>
+          <a:p>
+            <a:r>
+              <a:rPr lang="en-US" dirty="0" smtClean="0"/>
+              <a:t>Displays customer, product purchased, date purchased, and if a coupon was used.</a:t>
+            </a:r>
+          </a:p>
+          <a:p>
+            <a:r>
+              <a:rPr lang="en-US" dirty="0" smtClean="0"/>
+              <a:t>Information is pulled from database by...</a:t>
+            </a:r>
           </a:p>
         </p:txBody>
       </p:sp>
       <p:pic>
         <p:nvPicPr>
-          <p:cNvPr id="4" name="Picture 3"/>
+          <p:cNvPr id="5" name="Picture 4" descr="Screen Shot 2015-11-09 at 2.57.53 AM.png"/>
           <p:cNvPicPr>
             <a:picLocks noChangeAspect="1"/>
           </p:cNvPicPr>
           <p:nvPr/>
         </p:nvPicPr>
         <p:blipFill>
-          <a:blip r:embed="rId2"/>
+          <a:blip r:embed="rId2">
+            <a:extLst>
+              <a:ext uri="{28A0092B-C50C-407E-A947-70E740481C1C}">
+                <a14:useLocalDpi xmlns:a14="http://schemas.microsoft.com/office/drawing/2010/main" val="0"/>
+              </a:ext>
+            </a:extLst>
+          </a:blip>
           <a:stretch>
             <a:fillRect/>
           </a:stretch>
         </p:blipFill>
         <p:spPr>
           <a:xfrm>
-            <a:off x="838200" y="1690688"/>
-            <a:ext cx="10363200" cy="1866900"/>
+            <a:off x="1554252" y="1611235"/>
+            <a:ext cx="8890324" cy="1859357"/>
           </a:xfrm>
           <a:prstGeom prst="rect">
             <a:avLst/>
           </a:prstGeom>
         </p:spPr>
       </p:pic>
-      <p:sp>
-        <p:nvSpPr>
-          <p:cNvPr id="5" name="TextBox 4"/>
-          <p:cNvSpPr txBox="1"/>
-          <p:nvPr/>
-        </p:nvSpPr>
-        <p:spPr>
-          <a:xfrm>
-            <a:off x="1145309" y="3491345"/>
-            <a:ext cx="9652000" cy="1477328"/>
-          </a:xfrm>
-          <a:prstGeom prst="rect">
-            <a:avLst/>
-          </a:prstGeom>
-          <a:noFill/>
-        </p:spPr>
-        <p:txBody>
-          <a:bodyPr wrap="square" rtlCol="0">
-            <a:spAutoFit/>
-          </a:bodyPr>
-          <a:lstStyle/>
-          <a:p>
-            <a:pPr marL="285750" indent="-285750">
-              <a:buFont typeface="Arial" panose="020B0604020202020204" pitchFamily="34" charset="0"/>
-              <a:buChar char="•"/>
-            </a:pPr>
-            <a:r>
-              <a:rPr lang="en-US" dirty="0" smtClean="0"/>
-              <a:t>The application is capable of generating reports by pulling information from the database</a:t>
-            </a:r>
-          </a:p>
-          <a:p>
-            <a:pPr marL="742950" lvl="1" indent="-285750">
-              <a:buFont typeface="Arial" panose="020B0604020202020204" pitchFamily="34" charset="0"/>
-              <a:buChar char="•"/>
-            </a:pPr>
-            <a:r>
-              <a:rPr lang="en-US" dirty="0" smtClean="0"/>
-              <a:t>Generate Sales Report</a:t>
-            </a:r>
-          </a:p>
-          <a:p>
-            <a:pPr marL="742950" lvl="1" indent="-285750">
-              <a:buFont typeface="Arial" panose="020B0604020202020204" pitchFamily="34" charset="0"/>
-              <a:buChar char="•"/>
-            </a:pPr>
-            <a:r>
-              <a:rPr lang="en-US" dirty="0" smtClean="0"/>
-              <a:t>Customer Absent Report</a:t>
-            </a:r>
-          </a:p>
-          <a:p>
-            <a:pPr marL="742950" lvl="1" indent="-285750">
-              <a:buFont typeface="Arial" panose="020B0604020202020204" pitchFamily="34" charset="0"/>
-              <a:buChar char="•"/>
-            </a:pPr>
-            <a:r>
-              <a:rPr lang="en-US" dirty="0" smtClean="0"/>
-              <a:t>Frequent Buyer</a:t>
-            </a:r>
-          </a:p>
-          <a:p>
-            <a:pPr marL="742950" lvl="1" indent="-285750">
-              <a:buFont typeface="Arial" panose="020B0604020202020204" pitchFamily="34" charset="0"/>
-              <a:buChar char="•"/>
-            </a:pPr>
-            <a:r>
-              <a:rPr lang="en-US" dirty="0" smtClean="0"/>
-              <a:t>Coupon Ratio Report</a:t>
-            </a:r>
-          </a:p>
-        </p:txBody>
-      </p:sp>
     </p:spTree>
     <p:extLst>
       <p:ext uri="{BB962C8B-B14F-4D97-AF65-F5344CB8AC3E}">
-        <p14:creationId xmlns:p14="http://schemas.microsoft.com/office/powerpoint/2010/main" val="592636215"/>
+        <p14:creationId xmlns:p14="http://schemas.microsoft.com/office/powerpoint/2010/main" val="1735413863"/>
       </p:ext>
     </p:extLst>
   </p:cSld>
@@ -3491,7 +3514,7 @@
   <p:timing>
     <p:tnLst>
       <p:par>
-        <p:cTn id="1" dur="indefinite" restart="never" nodeType="tmRoot"/>
+        <p:cTn xmlns:p14="http://schemas.microsoft.com/office/powerpoint/2010/main" id="1" dur="indefinite" restart="never" nodeType="tmRoot"/>
       </p:par>
     </p:tnLst>
   </p:timing>
@@ -3570,7 +3593,7 @@
   <p:timing>
     <p:tnLst>
       <p:par>
-        <p:cTn id="1" dur="indefinite" restart="never" nodeType="tmRoot"/>
+        <p:cTn xmlns:p14="http://schemas.microsoft.com/office/powerpoint/2010/main" id="1" dur="indefinite" restart="never" nodeType="tmRoot"/>
       </p:par>
     </p:tnLst>
   </p:timing>
@@ -3649,7 +3672,7 @@
   <p:timing>
     <p:tnLst>
       <p:par>
-        <p:cTn id="1" dur="indefinite" restart="never" nodeType="tmRoot"/>
+        <p:cTn xmlns:p14="http://schemas.microsoft.com/office/powerpoint/2010/main" id="1" dur="indefinite" restart="never" nodeType="tmRoot"/>
       </p:par>
     </p:tnLst>
   </p:timing>
@@ -3728,7 +3751,7 @@
   <p:timing>
     <p:tnLst>
       <p:par>
-        <p:cTn id="1" dur="indefinite" restart="never" nodeType="tmRoot"/>
+        <p:cTn xmlns:p14="http://schemas.microsoft.com/office/powerpoint/2010/main" id="1" dur="indefinite" restart="never" nodeType="tmRoot"/>
       </p:par>
     </p:tnLst>
   </p:timing>
@@ -3807,7 +3830,7 @@
   <p:timing>
     <p:tnLst>
       <p:par>
-        <p:cTn id="1" dur="indefinite" restart="never" nodeType="tmRoot"/>
+        <p:cTn xmlns:p14="http://schemas.microsoft.com/office/powerpoint/2010/main" id="1" dur="indefinite" restart="never" nodeType="tmRoot"/>
       </p:par>
     </p:tnLst>
   </p:timing>
@@ -3886,7 +3909,7 @@
   <p:timing>
     <p:tnLst>
       <p:par>
-        <p:cTn id="1" dur="indefinite" restart="never" nodeType="tmRoot"/>
+        <p:cTn xmlns:p14="http://schemas.microsoft.com/office/powerpoint/2010/main" id="1" dur="indefinite" restart="never" nodeType="tmRoot"/>
       </p:par>
     </p:tnLst>
   </p:timing>
@@ -3965,7 +3988,7 @@
   <p:timing>
     <p:tnLst>
       <p:par>
-        <p:cTn id="1" dur="indefinite" restart="never" nodeType="tmRoot"/>
+        <p:cTn xmlns:p14="http://schemas.microsoft.com/office/powerpoint/2010/main" id="1" dur="indefinite" restart="never" nodeType="tmRoot"/>
       </p:par>
     </p:tnLst>
   </p:timing>
@@ -4044,7 +4067,7 @@
   <p:timing>
     <p:tnLst>
       <p:par>
-        <p:cTn id="1" dur="indefinite" restart="never" nodeType="tmRoot"/>
+        <p:cTn xmlns:p14="http://schemas.microsoft.com/office/powerpoint/2010/main" id="1" dur="indefinite" restart="never" nodeType="tmRoot"/>
       </p:par>
     </p:tnLst>
   </p:timing>
@@ -4147,7 +4170,7 @@
   <p:timing>
     <p:tnLst>
       <p:par>
-        <p:cTn id="1" dur="indefinite" restart="never" nodeType="tmRoot"/>
+        <p:cTn xmlns:p14="http://schemas.microsoft.com/office/powerpoint/2010/main" id="1" dur="indefinite" restart="never" nodeType="tmRoot"/>
       </p:par>
     </p:tnLst>
   </p:timing>
@@ -4226,7 +4249,7 @@
   <p:timing>
     <p:tnLst>
       <p:par>
-        <p:cTn id="1" dur="indefinite" restart="never" nodeType="tmRoot"/>
+        <p:cTn xmlns:p14="http://schemas.microsoft.com/office/powerpoint/2010/main" id="1" dur="indefinite" restart="never" nodeType="tmRoot"/>
       </p:par>
     </p:tnLst>
   </p:timing>
@@ -4305,7 +4328,7 @@
   <p:timing>
     <p:tnLst>
       <p:par>
-        <p:cTn id="1" dur="indefinite" restart="never" nodeType="tmRoot"/>
+        <p:cTn xmlns:p14="http://schemas.microsoft.com/office/powerpoint/2010/main" id="1" dur="indefinite" restart="never" nodeType="tmRoot"/>
       </p:par>
     </p:tnLst>
   </p:timing>
@@ -4384,7 +4407,7 @@
   <p:timing>
     <p:tnLst>
       <p:par>
-        <p:cTn id="1" dur="indefinite" restart="never" nodeType="tmRoot"/>
+        <p:cTn xmlns:p14="http://schemas.microsoft.com/office/powerpoint/2010/main" id="1" dur="indefinite" restart="never" nodeType="tmRoot"/>
       </p:par>
     </p:tnLst>
   </p:timing>
@@ -4471,7 +4494,7 @@
   <p:timing>
     <p:tnLst>
       <p:par>
-        <p:cTn id="1" dur="indefinite" restart="never" nodeType="tmRoot"/>
+        <p:cTn xmlns:p14="http://schemas.microsoft.com/office/powerpoint/2010/main" id="1" dur="indefinite" restart="never" nodeType="tmRoot"/>
       </p:par>
     </p:tnLst>
   </p:timing>
@@ -4550,7 +4573,7 @@
   <p:timing>
     <p:tnLst>
       <p:par>
-        <p:cTn id="1" dur="indefinite" restart="never" nodeType="tmRoot"/>
+        <p:cTn xmlns:p14="http://schemas.microsoft.com/office/powerpoint/2010/main" id="1" dur="indefinite" restart="never" nodeType="tmRoot"/>
       </p:par>
     </p:tnLst>
   </p:timing>
@@ -4672,7 +4695,7 @@
   <p:timing>
     <p:tnLst>
       <p:par>
-        <p:cTn id="1" dur="indefinite" restart="never" nodeType="tmRoot"/>
+        <p:cTn xmlns:p14="http://schemas.microsoft.com/office/powerpoint/2010/main" id="1" dur="indefinite" restart="never" nodeType="tmRoot"/>
       </p:par>
     </p:tnLst>
   </p:timing>
@@ -4828,7 +4851,7 @@
   <p:timing>
     <p:tnLst>
       <p:par>
-        <p:cTn id="1" dur="indefinite" restart="never" nodeType="tmRoot"/>
+        <p:cTn xmlns:p14="http://schemas.microsoft.com/office/powerpoint/2010/main" id="1" dur="indefinite" restart="never" nodeType="tmRoot"/>
       </p:par>
     </p:tnLst>
   </p:timing>
@@ -4911,7 +4934,11 @@
           <a:p>
             <a:r>
               <a:rPr lang="en-US" dirty="0" smtClean="0"/>
-              <a:t>Upon logging in you will be on the Main Page.</a:t>
+              <a:t>Upon logging in you will be on the Main Page</a:t>
+            </a:r>
+            <a:r>
+              <a:rPr lang="en-US" dirty="0" smtClean="0"/>
+              <a:t>.</a:t>
             </a:r>
           </a:p>
           <a:p>
@@ -4927,75 +4954,64 @@
       </p:sp>
       <p:pic>
         <p:nvPicPr>
-          <p:cNvPr id="4" name="Picture 3"/>
+          <p:cNvPr id="7" name="Picture 6" descr="Screen Shot 2015-11-09 at 2.55.30 AM.png"/>
           <p:cNvPicPr>
             <a:picLocks noChangeAspect="1"/>
           </p:cNvPicPr>
           <p:nvPr/>
         </p:nvPicPr>
         <p:blipFill>
-          <a:blip r:embed="rId2"/>
+          <a:blip r:embed="rId2">
+            <a:extLst>
+              <a:ext uri="{28A0092B-C50C-407E-A947-70E740481C1C}">
+                <a14:useLocalDpi xmlns:a14="http://schemas.microsoft.com/office/drawing/2010/main" val="0"/>
+              </a:ext>
+            </a:extLst>
+          </a:blip>
           <a:stretch>
             <a:fillRect/>
           </a:stretch>
         </p:blipFill>
         <p:spPr>
           <a:xfrm>
-            <a:off x="838200" y="1690687"/>
-            <a:ext cx="10515600" cy="533400"/>
+            <a:off x="373021" y="1354532"/>
+            <a:ext cx="11445959" cy="658168"/>
           </a:xfrm>
           <a:prstGeom prst="rect">
             <a:avLst/>
           </a:prstGeom>
         </p:spPr>
       </p:pic>
-      <p:sp>
-        <p:nvSpPr>
-          <p:cNvPr id="5" name="TextBox 4"/>
-          <p:cNvSpPr txBox="1"/>
+      <p:pic>
+        <p:nvPicPr>
+          <p:cNvPr id="8" name="Picture 7" descr="Screen Shot 2015-11-09 at 2.56.49 AM.png"/>
+          <p:cNvPicPr>
+            <a:picLocks noChangeAspect="1"/>
+          </p:cNvPicPr>
           <p:nvPr/>
-        </p:nvSpPr>
+        </p:nvPicPr>
+        <p:blipFill>
+          <a:blip r:embed="rId3">
+            <a:extLst>
+              <a:ext uri="{28A0092B-C50C-407E-A947-70E740481C1C}">
+                <a14:useLocalDpi xmlns:a14="http://schemas.microsoft.com/office/drawing/2010/main" val="0"/>
+              </a:ext>
+            </a:extLst>
+          </a:blip>
+          <a:stretch>
+            <a:fillRect/>
+          </a:stretch>
+        </p:blipFill>
         <p:spPr>
           <a:xfrm>
-            <a:off x="7269018" y="2224087"/>
-            <a:ext cx="4291878" cy="2031325"/>
+            <a:off x="6344263" y="2237897"/>
+            <a:ext cx="5776684" cy="4229358"/>
           </a:xfrm>
           <a:prstGeom prst="rect">
             <a:avLst/>
           </a:prstGeom>
-          <a:noFill/>
         </p:spPr>
-        <p:txBody>
-          <a:bodyPr wrap="square" rtlCol="0">
-            <a:spAutoFit/>
-          </a:bodyPr>
-          <a:lstStyle/>
-          <a:p>
-            <a:endParaRPr lang="en-US" dirty="0" smtClean="0"/>
-          </a:p>
-          <a:p>
-            <a:endParaRPr lang="en-US" dirty="0"/>
-          </a:p>
-          <a:p>
-            <a:endParaRPr lang="en-US" dirty="0" smtClean="0"/>
-          </a:p>
-          <a:p>
-            <a:endParaRPr lang="en-US" dirty="0"/>
-          </a:p>
-          <a:p>
-            <a:endParaRPr lang="en-US" dirty="0" smtClean="0"/>
-          </a:p>
-          <a:p>
-            <a:endParaRPr lang="en-US" dirty="0"/>
-          </a:p>
-          <a:p>
-            <a:r>
-              <a:rPr lang="en-US" dirty="0" smtClean="0"/>
-              <a:t>Picture of Main Page will go here?</a:t>
-            </a:r>
-          </a:p>
-        </p:txBody>
-      </p:sp>
+      </p:pic>
     </p:spTree>
     <p:extLst>
       <p:ext uri="{BB962C8B-B14F-4D97-AF65-F5344CB8AC3E}">
@@ -5009,7 +5025,7 @@
   <p:timing>
     <p:tnLst>
       <p:par>
-        <p:cTn id="1" dur="indefinite" restart="never" nodeType="tmRoot"/>
+        <p:cTn xmlns:p14="http://schemas.microsoft.com/office/powerpoint/2010/main" id="1" dur="indefinite" restart="never" nodeType="tmRoot"/>
       </p:par>
     </p:tnLst>
   </p:timing>
@@ -5050,7 +5066,7 @@
           <a:p>
             <a:r>
               <a:rPr lang="en-US" dirty="0" smtClean="0"/>
-              <a:t>Sales Summary Report</a:t>
+              <a:t>Coupon Management and Add Coupon</a:t>
             </a:r>
             <a:endParaRPr lang="en-US" dirty="0"/>
           </a:p>
@@ -5068,58 +5084,20 @@
         </p:nvSpPr>
         <p:spPr>
           <a:xfrm>
-            <a:off x="4710545" y="2503054"/>
-            <a:ext cx="6643255" cy="3538971"/>
+            <a:off x="838200" y="3269457"/>
+            <a:ext cx="10515600" cy="4351338"/>
           </a:xfrm>
         </p:spPr>
         <p:txBody>
           <a:bodyPr/>
           <a:lstStyle/>
           <a:p>
-            <a:r>
-              <a:rPr lang="en-US" dirty="0" smtClean="0"/>
-              <a:t>The Sales Summary Report tab displays sales information for the current date.</a:t>
-            </a:r>
-          </a:p>
-          <a:p>
-            <a:r>
-              <a:rPr lang="en-US" dirty="0" smtClean="0"/>
-              <a:t>Displays customer, product purchased, date purchased, and if a coupon was used.</a:t>
-            </a:r>
-          </a:p>
-          <a:p>
-            <a:r>
-              <a:rPr lang="en-US" dirty="0" smtClean="0"/>
-              <a:t>Information is pulled from database by...</a:t>
-            </a:r>
-          </a:p>
-        </p:txBody>
-      </p:sp>
-      <p:sp>
-        <p:nvSpPr>
-          <p:cNvPr id="4" name="TextBox 3"/>
-          <p:cNvSpPr txBox="1"/>
-          <p:nvPr/>
-        </p:nvSpPr>
-        <p:spPr>
-          <a:xfrm>
-            <a:off x="1708727" y="3497025"/>
-            <a:ext cx="4202545" cy="369332"/>
-          </a:xfrm>
-          <a:prstGeom prst="rect">
-            <a:avLst/>
-          </a:prstGeom>
-          <a:noFill/>
-        </p:spPr>
-        <p:txBody>
-          <a:bodyPr wrap="square" rtlCol="0">
-            <a:spAutoFit/>
-          </a:bodyPr>
-          <a:lstStyle/>
-          <a:p>
-            <a:r>
-              <a:rPr lang="en-US" dirty="0" smtClean="0"/>
-              <a:t>Picture goes here</a:t>
+            <a:endParaRPr lang="en-US" dirty="0" smtClean="0"/>
+          </a:p>
+          <a:p>
+            <a:r>
+              <a:rPr lang="en-US" dirty="0" smtClean="0"/>
+              <a:t>Coupon Management allows users to Add, Edit, Delete, or View Available Coupons.</a:t>
             </a:r>
             <a:endParaRPr lang="en-US" dirty="0"/>
           </a:p>
@@ -5127,22 +5105,28 @@
       </p:sp>
       <p:pic>
         <p:nvPicPr>
-          <p:cNvPr id="6" name="Picture 5"/>
+          <p:cNvPr id="5" name="Picture 4" descr="Screen Shot 2015-11-09 at 3.01.56 AM.png"/>
           <p:cNvPicPr>
             <a:picLocks noChangeAspect="1"/>
           </p:cNvPicPr>
           <p:nvPr/>
         </p:nvPicPr>
         <p:blipFill>
-          <a:blip r:embed="rId2"/>
+          <a:blip r:embed="rId2">
+            <a:extLst>
+              <a:ext uri="{28A0092B-C50C-407E-A947-70E740481C1C}">
+                <a14:useLocalDpi xmlns:a14="http://schemas.microsoft.com/office/drawing/2010/main" val="0"/>
+              </a:ext>
+            </a:extLst>
+          </a:blip>
           <a:stretch>
             <a:fillRect/>
           </a:stretch>
         </p:blipFill>
         <p:spPr>
           <a:xfrm>
-            <a:off x="838200" y="1738313"/>
-            <a:ext cx="10601325" cy="485775"/>
+            <a:off x="1424362" y="1777464"/>
+            <a:ext cx="9343277" cy="1733616"/>
           </a:xfrm>
           <a:prstGeom prst="rect">
             <a:avLst/>
@@ -5152,7 +5136,7 @@
     </p:spTree>
     <p:extLst>
       <p:ext uri="{BB962C8B-B14F-4D97-AF65-F5344CB8AC3E}">
-        <p14:creationId xmlns:p14="http://schemas.microsoft.com/office/powerpoint/2010/main" val="1735413863"/>
+        <p14:creationId xmlns:p14="http://schemas.microsoft.com/office/powerpoint/2010/main" val="1713498334"/>
       </p:ext>
     </p:extLst>
   </p:cSld>
@@ -5162,7 +5146,7 @@
   <p:timing>
     <p:tnLst>
       <p:par>
-        <p:cTn id="1" dur="indefinite" restart="never" nodeType="tmRoot"/>
+        <p:cTn xmlns:p14="http://schemas.microsoft.com/office/powerpoint/2010/main" id="1" dur="indefinite" restart="never" nodeType="tmRoot"/>
       </p:par>
     </p:tnLst>
   </p:timing>
@@ -5203,7 +5187,7 @@
           <a:p>
             <a:r>
               <a:rPr lang="en-US" dirty="0" smtClean="0"/>
-              <a:t>Coupon Management and Add Coupon</a:t>
+              <a:t>Coupon Management and Adding Coupon</a:t>
             </a:r>
             <a:endParaRPr lang="en-US" dirty="0"/>
           </a:p>
@@ -5211,38 +5195,139 @@
       </p:sp>
       <p:sp>
         <p:nvSpPr>
-          <p:cNvPr id="3" name="Content Placeholder 2"/>
-          <p:cNvSpPr>
-            <a:spLocks noGrp="1"/>
-          </p:cNvSpPr>
-          <p:nvPr>
-            <p:ph idx="1"/>
-          </p:nvPr>
+          <p:cNvPr id="7" name="TextBox 6"/>
+          <p:cNvSpPr txBox="1"/>
+          <p:nvPr/>
         </p:nvSpPr>
         <p:spPr>
           <a:xfrm>
-            <a:off x="838200" y="3269457"/>
-            <a:ext cx="10515600" cy="4351338"/>
+            <a:off x="4407196" y="2378212"/>
+            <a:ext cx="7221386" cy="5016758"/>
           </a:xfrm>
+          <a:prstGeom prst="rect">
+            <a:avLst/>
+          </a:prstGeom>
+          <a:noFill/>
         </p:spPr>
         <p:txBody>
-          <a:bodyPr/>
-          <a:lstStyle/>
-          <a:p>
-            <a:endParaRPr lang="en-US" dirty="0" smtClean="0"/>
-          </a:p>
-          <a:p>
-            <a:r>
-              <a:rPr lang="en-US" dirty="0" smtClean="0"/>
-              <a:t>Coupon Management allows users to Add, Edit, Delete, or View Available Coupons.</a:t>
-            </a:r>
-            <a:endParaRPr lang="en-US" dirty="0"/>
+          <a:bodyPr wrap="square" rtlCol="0">
+            <a:spAutoFit/>
+          </a:bodyPr>
+          <a:lstStyle/>
+          <a:p>
+            <a:pPr marL="285750" indent="-285750">
+              <a:buFont typeface="Arial" panose="020B0604020202020204" pitchFamily="34" charset="0"/>
+              <a:buChar char="•"/>
+            </a:pPr>
+            <a:endParaRPr lang="en-US" sz="2000" dirty="0" smtClean="0"/>
+          </a:p>
+          <a:p>
+            <a:pPr marL="285750" indent="-285750">
+              <a:buFont typeface="Arial" panose="020B0604020202020204" pitchFamily="34" charset="0"/>
+              <a:buChar char="•"/>
+            </a:pPr>
+            <a:endParaRPr lang="en-US" sz="2000" dirty="0"/>
+          </a:p>
+          <a:p>
+            <a:pPr marL="285750" indent="-285750">
+              <a:buFont typeface="Arial" panose="020B0604020202020204" pitchFamily="34" charset="0"/>
+              <a:buChar char="•"/>
+            </a:pPr>
+            <a:endParaRPr lang="en-US" sz="2000" dirty="0" smtClean="0"/>
+          </a:p>
+          <a:p>
+            <a:pPr marL="285750" indent="-285750">
+              <a:buFont typeface="Arial" panose="020B0604020202020204" pitchFamily="34" charset="0"/>
+              <a:buChar char="•"/>
+            </a:pPr>
+            <a:r>
+              <a:rPr lang="en-US" sz="2000" dirty="0" smtClean="0"/>
+              <a:t>You must first select a product, here we have Beer with a retail price of $11.99</a:t>
+            </a:r>
+          </a:p>
+          <a:p>
+            <a:pPr marL="285750" indent="-285750">
+              <a:buFont typeface="Arial" panose="020B0604020202020204" pitchFamily="34" charset="0"/>
+              <a:buChar char="•"/>
+            </a:pPr>
+            <a:r>
+              <a:rPr lang="en-US" sz="2000" dirty="0" smtClean="0"/>
+              <a:t>Then you enter the dollar amount you want the coupon to save, we entered the coupon’s worth of $11.00.</a:t>
+            </a:r>
+          </a:p>
+          <a:p>
+            <a:pPr marL="285750" indent="-285750">
+              <a:buFont typeface="Arial" panose="020B0604020202020204" pitchFamily="34" charset="0"/>
+              <a:buChar char="•"/>
+            </a:pPr>
+            <a:r>
+              <a:rPr lang="en-US" sz="2000" dirty="0" smtClean="0"/>
+              <a:t>Enter a start date for the coupon, this coupon begins 2015-11-09.</a:t>
+            </a:r>
+          </a:p>
+          <a:p>
+            <a:pPr marL="285750" indent="-285750">
+              <a:buFont typeface="Arial" panose="020B0604020202020204" pitchFamily="34" charset="0"/>
+              <a:buChar char="•"/>
+            </a:pPr>
+            <a:r>
+              <a:rPr lang="en-US" sz="2000" dirty="0" smtClean="0"/>
+              <a:t>Enter a end date, this coupon expires on 2016-02-01.</a:t>
+            </a:r>
+          </a:p>
+          <a:p>
+            <a:pPr marL="285750" indent="-285750">
+              <a:buFont typeface="Arial" panose="020B0604020202020204" pitchFamily="34" charset="0"/>
+              <a:buChar char="•"/>
+            </a:pPr>
+            <a:r>
+              <a:rPr lang="en-US" sz="2000" dirty="0" smtClean="0"/>
+              <a:t>By clicking Add Coupon customers can now purchase Beer for $0.99.</a:t>
+            </a:r>
+          </a:p>
+          <a:p>
+            <a:pPr marL="285750" indent="-285750">
+              <a:buFont typeface="Arial" panose="020B0604020202020204" pitchFamily="34" charset="0"/>
+              <a:buChar char="•"/>
+            </a:pPr>
+            <a:r>
+              <a:rPr lang="en-US" sz="2000" dirty="0" smtClean="0"/>
+              <a:t>At anytime you can click Clear Entry to try again.</a:t>
+            </a:r>
+          </a:p>
+          <a:p>
+            <a:pPr marL="285750" indent="-285750">
+              <a:buFont typeface="Arial" panose="020B0604020202020204" pitchFamily="34" charset="0"/>
+              <a:buChar char="•"/>
+            </a:pPr>
+            <a:endParaRPr lang="en-US" sz="2000" dirty="0"/>
+          </a:p>
+          <a:p>
+            <a:pPr marL="285750" indent="-285750">
+              <a:buFont typeface="Arial" panose="020B0604020202020204" pitchFamily="34" charset="0"/>
+              <a:buChar char="•"/>
+            </a:pPr>
+            <a:endParaRPr lang="en-US" sz="2000" dirty="0"/>
+          </a:p>
+          <a:p>
+            <a:pPr marL="285750" indent="-285750">
+              <a:buFont typeface="Arial" panose="020B0604020202020204" pitchFamily="34" charset="0"/>
+              <a:buChar char="•"/>
+            </a:pPr>
+            <a:endParaRPr lang="en-US" sz="2000" dirty="0" smtClean="0"/>
+          </a:p>
+          <a:p>
+            <a:pPr marL="285750" indent="-285750">
+              <a:buFont typeface="Arial" panose="020B0604020202020204" pitchFamily="34" charset="0"/>
+              <a:buChar char="•"/>
+            </a:pPr>
+            <a:endParaRPr lang="en-US" sz="2000" dirty="0"/>
           </a:p>
         </p:txBody>
       </p:sp>
       <p:pic>
         <p:nvPicPr>
-          <p:cNvPr id="8" name="Picture 7"/>
+          <p:cNvPr id="14" name="Picture 13"/>
           <p:cNvPicPr>
             <a:picLocks noChangeAspect="1"/>
           </p:cNvPicPr>
@@ -5256,8 +5341,45 @@
         </p:blipFill>
         <p:spPr>
           <a:xfrm>
-            <a:off x="304800" y="1412082"/>
-            <a:ext cx="11582400" cy="1857375"/>
+            <a:off x="838200" y="3389128"/>
+            <a:ext cx="3451232" cy="3014981"/>
+          </a:xfrm>
+          <a:prstGeom prst="rect">
+            <a:avLst/>
+          </a:prstGeom>
+          <a:effectLst>
+            <a:outerShdw blurRad="50800" dist="38100" dir="8100000" algn="tr" rotWithShape="0">
+              <a:prstClr val="black">
+                <a:alpha val="40000"/>
+              </a:prstClr>
+            </a:outerShdw>
+          </a:effectLst>
+        </p:spPr>
+      </p:pic>
+      <p:pic>
+        <p:nvPicPr>
+          <p:cNvPr id="8" name="Picture 7" descr="Screen Shot 2015-11-09 at 3.01.56 AM.png"/>
+          <p:cNvPicPr>
+            <a:picLocks noChangeAspect="1"/>
+          </p:cNvPicPr>
+          <p:nvPr/>
+        </p:nvPicPr>
+        <p:blipFill>
+          <a:blip r:embed="rId3">
+            <a:extLst>
+              <a:ext uri="{28A0092B-C50C-407E-A947-70E740481C1C}">
+                <a14:useLocalDpi xmlns:a14="http://schemas.microsoft.com/office/drawing/2010/main" val="0"/>
+              </a:ext>
+            </a:extLst>
+          </a:blip>
+          <a:stretch>
+            <a:fillRect/>
+          </a:stretch>
+        </p:blipFill>
+        <p:spPr>
+          <a:xfrm>
+            <a:off x="1424362" y="1440003"/>
+            <a:ext cx="9343277" cy="1733616"/>
           </a:xfrm>
           <a:prstGeom prst="rect">
             <a:avLst/>
@@ -5267,7 +5389,7 @@
     </p:spTree>
     <p:extLst>
       <p:ext uri="{BB962C8B-B14F-4D97-AF65-F5344CB8AC3E}">
-        <p14:creationId xmlns:p14="http://schemas.microsoft.com/office/powerpoint/2010/main" val="1713498334"/>
+        <p14:creationId xmlns:p14="http://schemas.microsoft.com/office/powerpoint/2010/main" val="3949682001"/>
       </p:ext>
     </p:extLst>
   </p:cSld>
@@ -5277,7 +5399,7 @@
   <p:timing>
     <p:tnLst>
       <p:par>
-        <p:cTn id="1" dur="indefinite" restart="never" nodeType="tmRoot"/>
+        <p:cTn xmlns:p14="http://schemas.microsoft.com/office/powerpoint/2010/main" id="1" dur="indefinite" restart="never" nodeType="tmRoot"/>
       </p:par>
     </p:tnLst>
   </p:timing>
@@ -5318,7 +5440,7 @@
           <a:p>
             <a:r>
               <a:rPr lang="en-US" dirty="0" smtClean="0"/>
-              <a:t>Coupon Management and Adding Coupon</a:t>
+              <a:t>Coupon Management and Edit Coupon</a:t>
             </a:r>
             <a:endParaRPr lang="en-US" dirty="0"/>
           </a:p>
@@ -5326,148 +5448,53 @@
       </p:sp>
       <p:sp>
         <p:nvSpPr>
-          <p:cNvPr id="7" name="TextBox 6"/>
-          <p:cNvSpPr txBox="1"/>
-          <p:nvPr/>
+          <p:cNvPr id="3" name="Content Placeholder 2"/>
+          <p:cNvSpPr>
+            <a:spLocks noGrp="1"/>
+          </p:cNvSpPr>
+          <p:nvPr>
+            <p:ph idx="1"/>
+          </p:nvPr>
         </p:nvSpPr>
         <p:spPr>
           <a:xfrm>
-            <a:off x="4407196" y="2378212"/>
-            <a:ext cx="7221386" cy="5016758"/>
+            <a:off x="838200" y="3426690"/>
+            <a:ext cx="5904345" cy="3240956"/>
           </a:xfrm>
-          <a:prstGeom prst="rect">
-            <a:avLst/>
-          </a:prstGeom>
-          <a:noFill/>
         </p:spPr>
         <p:txBody>
-          <a:bodyPr wrap="square" rtlCol="0">
-            <a:spAutoFit/>
-          </a:bodyPr>
-          <a:lstStyle/>
-          <a:p>
-            <a:pPr marL="285750" indent="-285750">
-              <a:buFont typeface="Arial" panose="020B0604020202020204" pitchFamily="34" charset="0"/>
-              <a:buChar char="•"/>
-            </a:pPr>
-            <a:endParaRPr lang="en-US" sz="2000" dirty="0" smtClean="0"/>
-          </a:p>
-          <a:p>
-            <a:pPr marL="285750" indent="-285750">
-              <a:buFont typeface="Arial" panose="020B0604020202020204" pitchFamily="34" charset="0"/>
-              <a:buChar char="•"/>
-            </a:pPr>
-            <a:endParaRPr lang="en-US" sz="2000" dirty="0"/>
-          </a:p>
-          <a:p>
-            <a:pPr marL="285750" indent="-285750">
-              <a:buFont typeface="Arial" panose="020B0604020202020204" pitchFamily="34" charset="0"/>
-              <a:buChar char="•"/>
-            </a:pPr>
-            <a:endParaRPr lang="en-US" sz="2000" dirty="0" smtClean="0"/>
-          </a:p>
-          <a:p>
-            <a:pPr marL="285750" indent="-285750">
-              <a:buFont typeface="Arial" panose="020B0604020202020204" pitchFamily="34" charset="0"/>
-              <a:buChar char="•"/>
-            </a:pPr>
-            <a:r>
-              <a:rPr lang="en-US" sz="2000" dirty="0" smtClean="0"/>
-              <a:t>You must first select a product, here we have Beer with a retail price of $11.99</a:t>
-            </a:r>
-          </a:p>
-          <a:p>
-            <a:pPr marL="285750" indent="-285750">
-              <a:buFont typeface="Arial" panose="020B0604020202020204" pitchFamily="34" charset="0"/>
-              <a:buChar char="•"/>
-            </a:pPr>
-            <a:r>
-              <a:rPr lang="en-US" sz="2000" dirty="0" smtClean="0"/>
-              <a:t>Then you enter the dollar amount you want the coupon to save, we entered the coupon’s worth of $11.00.</a:t>
-            </a:r>
-          </a:p>
-          <a:p>
-            <a:pPr marL="285750" indent="-285750">
-              <a:buFont typeface="Arial" panose="020B0604020202020204" pitchFamily="34" charset="0"/>
-              <a:buChar char="•"/>
-            </a:pPr>
-            <a:r>
-              <a:rPr lang="en-US" sz="2000" dirty="0" smtClean="0"/>
-              <a:t>Enter a start date for the coupon, this coupon begins 2015-11-09.</a:t>
-            </a:r>
-          </a:p>
-          <a:p>
-            <a:pPr marL="285750" indent="-285750">
-              <a:buFont typeface="Arial" panose="020B0604020202020204" pitchFamily="34" charset="0"/>
-              <a:buChar char="•"/>
-            </a:pPr>
-            <a:r>
-              <a:rPr lang="en-US" sz="2000" dirty="0" smtClean="0"/>
-              <a:t>Enter a end date, this coupon expires on 2016-02-01.</a:t>
-            </a:r>
-          </a:p>
-          <a:p>
-            <a:pPr marL="285750" indent="-285750">
-              <a:buFont typeface="Arial" panose="020B0604020202020204" pitchFamily="34" charset="0"/>
-              <a:buChar char="•"/>
-            </a:pPr>
-            <a:r>
-              <a:rPr lang="en-US" sz="2000" dirty="0" smtClean="0"/>
-              <a:t>By clicking Add Coupon customers can now purchase</a:t>
-            </a:r>
-            <a:r>
-              <a:rPr lang="en-US" sz="2000" dirty="0" smtClean="0"/>
-              <a:t> Beer for $0.99.</a:t>
-            </a:r>
-          </a:p>
-          <a:p>
-            <a:pPr marL="285750" indent="-285750">
-              <a:buFont typeface="Arial" panose="020B0604020202020204" pitchFamily="34" charset="0"/>
-              <a:buChar char="•"/>
-            </a:pPr>
-            <a:r>
-              <a:rPr lang="en-US" sz="2000" dirty="0" smtClean="0"/>
-              <a:t>At anytime you can click Clear Entry </a:t>
-            </a:r>
-            <a:r>
-              <a:rPr lang="en-US" sz="2000" dirty="0" smtClean="0"/>
-              <a:t>to try again.</a:t>
-            </a:r>
-            <a:endParaRPr lang="en-US" sz="2000" dirty="0" smtClean="0"/>
-          </a:p>
-          <a:p>
-            <a:pPr marL="285750" indent="-285750">
-              <a:buFont typeface="Arial" panose="020B0604020202020204" pitchFamily="34" charset="0"/>
-              <a:buChar char="•"/>
-            </a:pPr>
-            <a:endParaRPr lang="en-US" sz="2000" dirty="0"/>
-          </a:p>
-          <a:p>
-            <a:pPr marL="285750" indent="-285750">
-              <a:buFont typeface="Arial" panose="020B0604020202020204" pitchFamily="34" charset="0"/>
-              <a:buChar char="•"/>
-            </a:pPr>
-            <a:endParaRPr lang="en-US" sz="2000" dirty="0"/>
-          </a:p>
-          <a:p>
-            <a:pPr marL="285750" indent="-285750">
-              <a:buFont typeface="Arial" panose="020B0604020202020204" pitchFamily="34" charset="0"/>
-              <a:buChar char="•"/>
-            </a:pPr>
-            <a:endParaRPr lang="en-US" sz="2000" dirty="0" smtClean="0"/>
-          </a:p>
-          <a:p>
-            <a:pPr marL="285750" indent="-285750">
-              <a:buFont typeface="Arial" panose="020B0604020202020204" pitchFamily="34" charset="0"/>
-              <a:buChar char="•"/>
-            </a:pPr>
-            <a:endParaRPr lang="en-US" sz="2000" dirty="0"/>
+          <a:bodyPr/>
+          <a:lstStyle/>
+          <a:p>
+            <a:r>
+              <a:rPr lang="en-US" dirty="0" smtClean="0"/>
+              <a:t>You can also edit any existing coupon.</a:t>
+            </a:r>
+          </a:p>
+          <a:p>
+            <a:r>
+              <a:rPr lang="en-US" dirty="0" smtClean="0"/>
+              <a:t>You are able to change the coupon savings amount.</a:t>
+            </a:r>
+          </a:p>
+          <a:p>
+            <a:r>
+              <a:rPr lang="en-US" dirty="0" smtClean="0"/>
+              <a:t>The start and end dates.</a:t>
+            </a:r>
+          </a:p>
+          <a:p>
+            <a:r>
+              <a:rPr lang="en-US" dirty="0" smtClean="0"/>
+              <a:t>Once you are done editing click Edit Coupon to save changes.</a:t>
+            </a:r>
+            <a:endParaRPr lang="en-US" dirty="0"/>
           </a:p>
         </p:txBody>
       </p:sp>
       <p:pic>
         <p:nvPicPr>
-          <p:cNvPr id="12" name="Picture 11"/>
+          <p:cNvPr id="7" name="Picture 6"/>
           <p:cNvPicPr>
             <a:picLocks noChangeAspect="1"/>
           </p:cNvPicPr>
@@ -5481,38 +5508,14 @@
         </p:blipFill>
         <p:spPr>
           <a:xfrm>
-            <a:off x="304800" y="1449522"/>
-            <a:ext cx="11582400" cy="1857375"/>
-          </a:xfrm>
-          <a:prstGeom prst="rect">
-            <a:avLst/>
-          </a:prstGeom>
-        </p:spPr>
-      </p:pic>
-      <p:pic>
-        <p:nvPicPr>
-          <p:cNvPr id="14" name="Picture 13"/>
-          <p:cNvPicPr>
-            <a:picLocks noChangeAspect="1"/>
-          </p:cNvPicPr>
-          <p:nvPr/>
-        </p:nvPicPr>
-        <p:blipFill>
-          <a:blip r:embed="rId3"/>
-          <a:stretch>
-            <a:fillRect/>
-          </a:stretch>
-        </p:blipFill>
-        <p:spPr>
-          <a:xfrm>
-            <a:off x="838200" y="3389128"/>
-            <a:ext cx="3451232" cy="3014981"/>
+            <a:off x="7343774" y="3405188"/>
+            <a:ext cx="3705225" cy="3076575"/>
           </a:xfrm>
           <a:prstGeom prst="rect">
             <a:avLst/>
           </a:prstGeom>
           <a:effectLst>
-            <a:outerShdw blurRad="50800" dist="38100" dir="8100000" algn="tr" rotWithShape="0">
+            <a:outerShdw blurRad="50800" dist="38100" dir="2700000" algn="tl" rotWithShape="0">
               <a:prstClr val="black">
                 <a:alpha val="40000"/>
               </a:prstClr>
@@ -5520,10 +5523,40 @@
           </a:effectLst>
         </p:spPr>
       </p:pic>
+      <p:pic>
+        <p:nvPicPr>
+          <p:cNvPr id="5" name="Picture 4" descr="Screen Shot 2015-11-09 at 3.02.01 AM.png"/>
+          <p:cNvPicPr>
+            <a:picLocks noChangeAspect="1"/>
+          </p:cNvPicPr>
+          <p:nvPr/>
+        </p:nvPicPr>
+        <p:blipFill>
+          <a:blip r:embed="rId3">
+            <a:extLst>
+              <a:ext uri="{28A0092B-C50C-407E-A947-70E740481C1C}">
+                <a14:useLocalDpi xmlns:a14="http://schemas.microsoft.com/office/drawing/2010/main" val="0"/>
+              </a:ext>
+            </a:extLst>
+          </a:blip>
+          <a:stretch>
+            <a:fillRect/>
+          </a:stretch>
+        </p:blipFill>
+        <p:spPr>
+          <a:xfrm>
+            <a:off x="1500964" y="1392083"/>
+            <a:ext cx="9190072" cy="1694560"/>
+          </a:xfrm>
+          <a:prstGeom prst="rect">
+            <a:avLst/>
+          </a:prstGeom>
+        </p:spPr>
+      </p:pic>
     </p:spTree>
     <p:extLst>
       <p:ext uri="{BB962C8B-B14F-4D97-AF65-F5344CB8AC3E}">
-        <p14:creationId xmlns:p14="http://schemas.microsoft.com/office/powerpoint/2010/main" val="3949682001"/>
+        <p14:creationId xmlns:p14="http://schemas.microsoft.com/office/powerpoint/2010/main" val="4227771524"/>
       </p:ext>
     </p:extLst>
   </p:cSld>
@@ -5533,7 +5566,7 @@
   <p:timing>
     <p:tnLst>
       <p:par>
-        <p:cTn id="1" dur="indefinite" restart="never" nodeType="tmRoot"/>
+        <p:cTn xmlns:p14="http://schemas.microsoft.com/office/powerpoint/2010/main" id="1" dur="indefinite" restart="never" nodeType="tmRoot"/>
       </p:par>
     </p:tnLst>
   </p:timing>
@@ -5574,7 +5607,7 @@
           <a:p>
             <a:r>
               <a:rPr lang="en-US" dirty="0" smtClean="0"/>
-              <a:t>Coupon Management and Edit Coupon</a:t>
+              <a:t>Coupon Management and Delete Coupon</a:t>
             </a:r>
             <a:endParaRPr lang="en-US" dirty="0"/>
           </a:p>
@@ -5592,8 +5625,8 @@
         </p:nvSpPr>
         <p:spPr>
           <a:xfrm>
-            <a:off x="838200" y="3426690"/>
-            <a:ext cx="5904345" cy="3240956"/>
+            <a:off x="5384800" y="3595688"/>
+            <a:ext cx="5969000" cy="1725036"/>
           </a:xfrm>
         </p:spPr>
         <p:txBody>
@@ -5602,25 +5635,7 @@
           <a:p>
             <a:r>
               <a:rPr lang="en-US" dirty="0" smtClean="0"/>
-              <a:t>You can also edit any existing coupon.</a:t>
-            </a:r>
-          </a:p>
-          <a:p>
-            <a:r>
-              <a:rPr lang="en-US" dirty="0" smtClean="0"/>
-              <a:t>You are able to change the coupon savings amount.</a:t>
-            </a:r>
-          </a:p>
-          <a:p>
-            <a:r>
-              <a:rPr lang="en-US" dirty="0" smtClean="0"/>
-              <a:t>The start and end dates.</a:t>
-            </a:r>
-          </a:p>
-          <a:p>
-            <a:r>
-              <a:rPr lang="en-US" dirty="0" smtClean="0"/>
-              <a:t>Once you are done editing click Edit Coupon to save changes.</a:t>
+              <a:t>You can delete a coupon by selecting it and simply clicking Delete Coupon.</a:t>
             </a:r>
             <a:endParaRPr lang="en-US" dirty="0"/>
           </a:p>
@@ -5642,8 +5657,8 @@
         </p:blipFill>
         <p:spPr>
           <a:xfrm>
-            <a:off x="561975" y="1690688"/>
-            <a:ext cx="11068050" cy="1714500"/>
+            <a:off x="838200" y="3595688"/>
+            <a:ext cx="4619625" cy="2028825"/>
           </a:xfrm>
           <a:prstGeom prst="rect">
             <a:avLst/>
@@ -5652,39 +5667,38 @@
       </p:pic>
       <p:pic>
         <p:nvPicPr>
-          <p:cNvPr id="7" name="Picture 6"/>
+          <p:cNvPr id="4" name="Picture 3" descr="Screen Shot 2015-11-09 at 3.02.07 AM.png"/>
           <p:cNvPicPr>
             <a:picLocks noChangeAspect="1"/>
           </p:cNvPicPr>
           <p:nvPr/>
         </p:nvPicPr>
         <p:blipFill>
-          <a:blip r:embed="rId3"/>
+          <a:blip r:embed="rId3">
+            <a:extLst>
+              <a:ext uri="{28A0092B-C50C-407E-A947-70E740481C1C}">
+                <a14:useLocalDpi xmlns:a14="http://schemas.microsoft.com/office/drawing/2010/main" val="0"/>
+              </a:ext>
+            </a:extLst>
+          </a:blip>
           <a:stretch>
             <a:fillRect/>
           </a:stretch>
         </p:blipFill>
         <p:spPr>
           <a:xfrm>
-            <a:off x="7343774" y="3405188"/>
-            <a:ext cx="3705225" cy="3076575"/>
+            <a:off x="1451006" y="1518134"/>
+            <a:ext cx="9289989" cy="1654382"/>
           </a:xfrm>
           <a:prstGeom prst="rect">
             <a:avLst/>
           </a:prstGeom>
-          <a:effectLst>
-            <a:outerShdw blurRad="50800" dist="38100" dir="2700000" algn="tl" rotWithShape="0">
-              <a:prstClr val="black">
-                <a:alpha val="40000"/>
-              </a:prstClr>
-            </a:outerShdw>
-          </a:effectLst>
         </p:spPr>
       </p:pic>
     </p:spTree>
     <p:extLst>
       <p:ext uri="{BB962C8B-B14F-4D97-AF65-F5344CB8AC3E}">
-        <p14:creationId xmlns:p14="http://schemas.microsoft.com/office/powerpoint/2010/main" val="4227771524"/>
+        <p14:creationId xmlns:p14="http://schemas.microsoft.com/office/powerpoint/2010/main" val="3257540605"/>
       </p:ext>
     </p:extLst>
   </p:cSld>
@@ -5694,7 +5708,7 @@
   <p:timing>
     <p:tnLst>
       <p:par>
-        <p:cTn id="1" dur="indefinite" restart="never" nodeType="tmRoot"/>
+        <p:cTn xmlns:p14="http://schemas.microsoft.com/office/powerpoint/2010/main" id="1" dur="indefinite" restart="never" nodeType="tmRoot"/>
       </p:par>
     </p:tnLst>
   </p:timing>
@@ -5744,7 +5758,7 @@
     </a:clrScheme>
     <a:fontScheme name="Office">
       <a:majorFont>
-        <a:latin typeface="Calibri Light" panose="020F0302020204030204"/>
+        <a:latin typeface="Calibri Light"/>
         <a:ea typeface=""/>
         <a:cs typeface=""/>
         <a:font script="Jpan" typeface="ＭＳ Ｐゴシック"/>
@@ -5779,7 +5793,7 @@
         <a:font script="Geor" typeface="Sylfaen"/>
       </a:majorFont>
       <a:minorFont>
-        <a:latin typeface="Calibri" panose="020F0502020204030204"/>
+        <a:latin typeface="Calibri"/>
         <a:ea typeface=""/>
         <a:cs typeface=""/>
         <a:font script="Jpan" typeface="ＭＳ Ｐゴシック"/>
@@ -5956,7 +5970,7 @@
   <a:extraClrSchemeLst/>
   <a:extLst>
     <a:ext uri="{05A4C25C-085E-4340-85A3-A5531E510DB2}">
-      <thm15:themeFamily xmlns:thm15="http://schemas.microsoft.com/office/thememl/2012/main" name="Office Theme" id="{62F939B6-93AF-4DB8-9C6B-D6C7DFDC589F}" vid="{4A3C46E8-61CC-4603-A589-7422A47A8E4A}"/>
+      <thm15:themeFamily xmlns:thm15="http://schemas.microsoft.com/office/thememl/2012/main" xmlns="" name="Office Theme" id="{62F939B6-93AF-4DB8-9C6B-D6C7DFDC589F}" vid="{4A3C46E8-61CC-4603-A589-7422A47A8E4A}"/>
     </a:ext>
   </a:extLst>
 </a:theme>

</xml_diff>